<commit_message>
Reformat language around findings
</commit_message>
<xml_diff>
--- a/reports/submission/Capstone_Final_Presentation.pptx
+++ b/reports/submission/Capstone_Final_Presentation.pptx
@@ -9,20 +9,19 @@
     <p:sldId id="257" r:id="rId3"/>
     <p:sldId id="261" r:id="rId4"/>
     <p:sldId id="258" r:id="rId5"/>
-    <p:sldId id="273" r:id="rId6"/>
-    <p:sldId id="259" r:id="rId7"/>
-    <p:sldId id="260" r:id="rId8"/>
-    <p:sldId id="262" r:id="rId9"/>
-    <p:sldId id="264" r:id="rId10"/>
-    <p:sldId id="263" r:id="rId11"/>
-    <p:sldId id="265" r:id="rId12"/>
-    <p:sldId id="266" r:id="rId13"/>
-    <p:sldId id="267" r:id="rId14"/>
-    <p:sldId id="268" r:id="rId15"/>
-    <p:sldId id="269" r:id="rId16"/>
-    <p:sldId id="270" r:id="rId17"/>
-    <p:sldId id="271" r:id="rId18"/>
-    <p:sldId id="272" r:id="rId19"/>
+    <p:sldId id="259" r:id="rId6"/>
+    <p:sldId id="260" r:id="rId7"/>
+    <p:sldId id="262" r:id="rId8"/>
+    <p:sldId id="264" r:id="rId9"/>
+    <p:sldId id="263" r:id="rId10"/>
+    <p:sldId id="265" r:id="rId11"/>
+    <p:sldId id="266" r:id="rId12"/>
+    <p:sldId id="267" r:id="rId13"/>
+    <p:sldId id="268" r:id="rId14"/>
+    <p:sldId id="269" r:id="rId15"/>
+    <p:sldId id="270" r:id="rId16"/>
+    <p:sldId id="271" r:id="rId17"/>
+    <p:sldId id="272" r:id="rId18"/>
   </p:sldIdLst>
   <p:sldSz cx="12192000" cy="6858000"/>
   <p:notesSz cx="6858000" cy="9144000"/>
@@ -121,6 +120,11 @@
       </a:defRPr>
     </a:lvl9pPr>
   </p:defaultTextStyle>
+  <p:extLst>
+    <p:ext uri="{EFAFB233-063F-42B5-8137-9DF3F51BA10A}">
+      <p15:sldGuideLst xmlns:p15="http://schemas.microsoft.com/office/powerpoint/2012/main"/>
+    </p:ext>
+  </p:extLst>
 </p:presentation>
 </file>
 
@@ -5605,391 +5609,6 @@
       </p:grpSpPr>
       <p:sp useBgFill="1">
         <p:nvSpPr>
-          <p:cNvPr id="23" name="Rectangle 22">
-            <a:extLst>
-              <a:ext uri="{FF2B5EF4-FFF2-40B4-BE49-F238E27FC236}">
-                <a16:creationId xmlns:a16="http://schemas.microsoft.com/office/drawing/2014/main" id="{0B9EE3F3-89B7-43C3-8651-C4C96830993D}"/>
-              </a:ext>
-              <a:ext uri="{C183D7F6-B498-43B3-948B-1728B52AA6E4}">
-                <adec:decorative xmlns:adec="http://schemas.microsoft.com/office/drawing/2017/decorative" val="1"/>
-              </a:ext>
-            </a:extLst>
-          </p:cNvPr>
-          <p:cNvSpPr>
-            <a:spLocks noGrp="1" noRot="1" noChangeAspect="1" noMove="1" noResize="1" noEditPoints="1" noAdjustHandles="1" noChangeArrowheads="1" noChangeShapeType="1" noTextEdit="1"/>
-          </p:cNvSpPr>
-          <p:nvPr>
-            <p:extLst>
-              <p:ext uri="{386F3935-93C4-4BCD-93E2-E3B085C9AB24}">
-                <p16:designElem xmlns:p16="http://schemas.microsoft.com/office/powerpoint/2015/main" val="1"/>
-              </p:ext>
-            </p:extLst>
-          </p:nvPr>
-        </p:nvSpPr>
-        <p:spPr>
-          <a:xfrm>
-            <a:off x="0" y="0"/>
-            <a:ext cx="12192000" cy="6858000"/>
-          </a:xfrm>
-          <a:prstGeom prst="rect">
-            <a:avLst/>
-          </a:prstGeom>
-          <a:ln>
-            <a:noFill/>
-          </a:ln>
-        </p:spPr>
-        <p:style>
-          <a:lnRef idx="2">
-            <a:schemeClr val="accent1">
-              <a:shade val="50000"/>
-            </a:schemeClr>
-          </a:lnRef>
-          <a:fillRef idx="1">
-            <a:schemeClr val="accent1"/>
-          </a:fillRef>
-          <a:effectRef idx="0">
-            <a:schemeClr val="accent1"/>
-          </a:effectRef>
-          <a:fontRef idx="minor">
-            <a:schemeClr val="lt1"/>
-          </a:fontRef>
-        </p:style>
-        <p:txBody>
-          <a:bodyPr rtlCol="0" anchor="ctr"/>
-          <a:lstStyle/>
-          <a:p>
-            <a:pPr algn="ctr"/>
-            <a:endParaRPr lang="en-US"/>
-          </a:p>
-        </p:txBody>
-      </p:sp>
-      <p:sp>
-        <p:nvSpPr>
-          <p:cNvPr id="2" name="Title 1">
-            <a:extLst>
-              <a:ext uri="{FF2B5EF4-FFF2-40B4-BE49-F238E27FC236}">
-                <a16:creationId xmlns:a16="http://schemas.microsoft.com/office/drawing/2014/main" id="{69B8BA33-CF05-0548-999E-720A8E0240B2}"/>
-              </a:ext>
-            </a:extLst>
-          </p:cNvPr>
-          <p:cNvSpPr>
-            <a:spLocks noGrp="1"/>
-          </p:cNvSpPr>
-          <p:nvPr>
-            <p:ph type="title"/>
-          </p:nvPr>
-        </p:nvSpPr>
-        <p:spPr>
-          <a:xfrm>
-            <a:off x="411480" y="991443"/>
-            <a:ext cx="4443154" cy="1087819"/>
-          </a:xfrm>
-        </p:spPr>
-        <p:txBody>
-          <a:bodyPr anchor="b">
-            <a:normAutofit/>
-          </a:bodyPr>
-          <a:lstStyle/>
-          <a:p>
-            <a:r>
-              <a:rPr lang="en-US" sz="2900"/>
-              <a:t>EDA: Most Percentage of Admissions Offers</a:t>
-            </a:r>
-          </a:p>
-        </p:txBody>
-      </p:sp>
-      <p:sp>
-        <p:nvSpPr>
-          <p:cNvPr id="25" name="Rectangle 24">
-            <a:extLst>
-              <a:ext uri="{FF2B5EF4-FFF2-40B4-BE49-F238E27FC236}">
-                <a16:creationId xmlns:a16="http://schemas.microsoft.com/office/drawing/2014/main" id="{33AE4636-AEEC-45D6-84D4-7AC2DA48ECF8}"/>
-              </a:ext>
-              <a:ext uri="{C183D7F6-B498-43B3-948B-1728B52AA6E4}">
-                <adec:decorative xmlns:adec="http://schemas.microsoft.com/office/drawing/2017/decorative" val="1"/>
-              </a:ext>
-            </a:extLst>
-          </p:cNvPr>
-          <p:cNvSpPr>
-            <a:spLocks noGrp="1" noRot="1" noChangeAspect="1" noMove="1" noResize="1" noEditPoints="1" noAdjustHandles="1" noChangeArrowheads="1" noChangeShapeType="1" noTextEdit="1"/>
-          </p:cNvSpPr>
-          <p:nvPr>
-            <p:extLst>
-              <p:ext uri="{386F3935-93C4-4BCD-93E2-E3B085C9AB24}">
-                <p16:designElem xmlns:p16="http://schemas.microsoft.com/office/powerpoint/2015/main" val="1"/>
-              </p:ext>
-            </p:extLst>
-          </p:nvPr>
-        </p:nvSpPr>
-        <p:spPr>
-          <a:xfrm rot="5400000">
-            <a:off x="649223" y="387939"/>
-            <a:ext cx="73152" cy="548640"/>
-          </a:xfrm>
-          <a:prstGeom prst="rect">
-            <a:avLst/>
-          </a:prstGeom>
-          <a:solidFill>
-            <a:schemeClr val="accent1"/>
-          </a:solidFill>
-          <a:ln>
-            <a:noFill/>
-          </a:ln>
-        </p:spPr>
-        <p:style>
-          <a:lnRef idx="2">
-            <a:schemeClr val="accent1">
-              <a:shade val="50000"/>
-            </a:schemeClr>
-          </a:lnRef>
-          <a:fillRef idx="1">
-            <a:schemeClr val="accent1"/>
-          </a:fillRef>
-          <a:effectRef idx="0">
-            <a:schemeClr val="accent1"/>
-          </a:effectRef>
-          <a:fontRef idx="minor">
-            <a:schemeClr val="lt1"/>
-          </a:fontRef>
-        </p:style>
-        <p:txBody>
-          <a:bodyPr rtlCol="0" anchor="ctr"/>
-          <a:lstStyle/>
-          <a:p>
-            <a:pPr marL="0" marR="0" lvl="0" indent="0" algn="ctr" defTabSz="914400" rtl="0" eaLnBrk="1" fontAlgn="auto" latinLnBrk="0" hangingPunct="1">
-              <a:lnSpc>
-                <a:spcPct val="100000"/>
-              </a:lnSpc>
-              <a:spcBef>
-                <a:spcPts val="0"/>
-              </a:spcBef>
-              <a:spcAft>
-                <a:spcPts val="0"/>
-              </a:spcAft>
-              <a:buClrTx/>
-              <a:buSzTx/>
-              <a:buFontTx/>
-              <a:buNone/>
-              <a:tabLst/>
-              <a:defRPr/>
-            </a:pPr>
-            <a:endParaRPr kumimoji="0" lang="en-US" sz="1800" b="0" i="0" u="none" strike="noStrike" kern="1200" cap="none" spc="0" normalizeH="0" baseline="0" noProof="0">
-              <a:ln>
-                <a:noFill/>
-              </a:ln>
-              <a:solidFill>
-                <a:prstClr val="white"/>
-              </a:solidFill>
-              <a:effectLst/>
-              <a:uLnTx/>
-              <a:uFillTx/>
-              <a:latin typeface="Calibri" panose="020F0502020204030204"/>
-              <a:ea typeface="+mn-ea"/>
-              <a:cs typeface="+mn-cs"/>
-            </a:endParaRPr>
-          </a:p>
-        </p:txBody>
-      </p:sp>
-      <p:sp>
-        <p:nvSpPr>
-          <p:cNvPr id="27" name="Rectangle 26">
-            <a:extLst>
-              <a:ext uri="{FF2B5EF4-FFF2-40B4-BE49-F238E27FC236}">
-                <a16:creationId xmlns:a16="http://schemas.microsoft.com/office/drawing/2014/main" id="{8D9CE0F4-2EB2-4F1F-8AAC-DB3571D9FE10}"/>
-              </a:ext>
-              <a:ext uri="{C183D7F6-B498-43B3-948B-1728B52AA6E4}">
-                <adec:decorative xmlns:adec="http://schemas.microsoft.com/office/drawing/2017/decorative" val="1"/>
-              </a:ext>
-            </a:extLst>
-          </p:cNvPr>
-          <p:cNvSpPr>
-            <a:spLocks noGrp="1" noRot="1" noChangeAspect="1" noMove="1" noResize="1" noEditPoints="1" noAdjustHandles="1" noChangeArrowheads="1" noChangeShapeType="1" noTextEdit="1"/>
-          </p:cNvSpPr>
-          <p:nvPr>
-            <p:extLst>
-              <p:ext uri="{386F3935-93C4-4BCD-93E2-E3B085C9AB24}">
-                <p16:designElem xmlns:p16="http://schemas.microsoft.com/office/powerpoint/2015/main" val="1"/>
-              </p:ext>
-            </p:extLst>
-          </p:nvPr>
-        </p:nvSpPr>
-        <p:spPr>
-          <a:xfrm>
-            <a:off x="411480" y="2285541"/>
-            <a:ext cx="4389120" cy="18288"/>
-          </a:xfrm>
-          <a:prstGeom prst="rect">
-            <a:avLst/>
-          </a:prstGeom>
-          <a:solidFill>
-            <a:schemeClr val="tx2">
-              <a:lumMod val="25000"/>
-              <a:lumOff val="75000"/>
-            </a:schemeClr>
-          </a:solidFill>
-          <a:ln w="3175">
-            <a:noFill/>
-          </a:ln>
-          <a:effectLst/>
-        </p:spPr>
-        <p:style>
-          <a:lnRef idx="2">
-            <a:schemeClr val="accent1">
-              <a:shade val="50000"/>
-            </a:schemeClr>
-          </a:lnRef>
-          <a:fillRef idx="1">
-            <a:schemeClr val="accent1"/>
-          </a:fillRef>
-          <a:effectRef idx="0">
-            <a:schemeClr val="accent1"/>
-          </a:effectRef>
-          <a:fontRef idx="minor">
-            <a:schemeClr val="lt1"/>
-          </a:fontRef>
-        </p:style>
-        <p:txBody>
-          <a:bodyPr rtlCol="0" anchor="ctr"/>
-          <a:lstStyle/>
-          <a:p>
-            <a:pPr marL="0" marR="0" lvl="0" indent="0" algn="ctr" defTabSz="914400" rtl="0" eaLnBrk="1" fontAlgn="auto" latinLnBrk="0" hangingPunct="1">
-              <a:lnSpc>
-                <a:spcPct val="100000"/>
-              </a:lnSpc>
-              <a:spcBef>
-                <a:spcPts val="0"/>
-              </a:spcBef>
-              <a:spcAft>
-                <a:spcPts val="0"/>
-              </a:spcAft>
-              <a:buClrTx/>
-              <a:buSzTx/>
-              <a:buFontTx/>
-              <a:buNone/>
-              <a:tabLst/>
-              <a:defRPr/>
-            </a:pPr>
-            <a:endParaRPr kumimoji="0" lang="en-US" sz="1800" b="0" i="0" u="none" strike="noStrike" kern="1200" cap="none" spc="0" normalizeH="0" baseline="0" noProof="0">
-              <a:ln>
-                <a:noFill/>
-              </a:ln>
-              <a:solidFill>
-                <a:prstClr val="white"/>
-              </a:solidFill>
-              <a:effectLst/>
-              <a:uLnTx/>
-              <a:uFillTx/>
-              <a:latin typeface="Calibri" panose="020F0502020204030204"/>
-              <a:ea typeface="+mn-ea"/>
-              <a:cs typeface="+mn-cs"/>
-            </a:endParaRPr>
-          </a:p>
-        </p:txBody>
-      </p:sp>
-      <p:sp>
-        <p:nvSpPr>
-          <p:cNvPr id="9" name="Content Placeholder 8">
-            <a:extLst>
-              <a:ext uri="{FF2B5EF4-FFF2-40B4-BE49-F238E27FC236}">
-                <a16:creationId xmlns:a16="http://schemas.microsoft.com/office/drawing/2014/main" id="{2D19A7FD-C0F9-4A34-B3FA-1E782BC1D38A}"/>
-              </a:ext>
-            </a:extLst>
-          </p:cNvPr>
-          <p:cNvSpPr>
-            <a:spLocks noGrp="1"/>
-          </p:cNvSpPr>
-          <p:nvPr>
-            <p:ph idx="1"/>
-          </p:nvPr>
-        </p:nvSpPr>
-        <p:spPr>
-          <a:xfrm>
-            <a:off x="411480" y="2684095"/>
-            <a:ext cx="4443154" cy="3492868"/>
-          </a:xfrm>
-        </p:spPr>
-        <p:txBody>
-          <a:bodyPr>
-            <a:normAutofit/>
-          </a:bodyPr>
-          <a:lstStyle/>
-          <a:p>
-            <a:r>
-              <a:rPr lang="en-US" sz="1700" dirty="0"/>
-              <a:t>Among the schools with the highest percentage of their test takers/students receiving admissions offers, nearly all have less than 50% Black &amp; Latinx student bodies (green).</a:t>
-            </a:r>
-          </a:p>
-        </p:txBody>
-      </p:sp>
-      <p:pic>
-        <p:nvPicPr>
-          <p:cNvPr id="5" name="Content Placeholder 4" descr="A picture containing chart&#10;&#10;Description automatically generated">
-            <a:extLst>
-              <a:ext uri="{FF2B5EF4-FFF2-40B4-BE49-F238E27FC236}">
-                <a16:creationId xmlns:a16="http://schemas.microsoft.com/office/drawing/2014/main" id="{59D188C5-604C-D347-B824-35D674034778}"/>
-              </a:ext>
-            </a:extLst>
-          </p:cNvPr>
-          <p:cNvPicPr>
-            <a:picLocks noChangeAspect="1"/>
-          </p:cNvPicPr>
-          <p:nvPr/>
-        </p:nvPicPr>
-        <p:blipFill rotWithShape="1">
-          <a:blip r:embed="rId2"/>
-          <a:srcRect l="7020" r="3" b="3"/>
-          <a:stretch/>
-        </p:blipFill>
-        <p:spPr>
-          <a:xfrm>
-            <a:off x="4855249" y="477391"/>
-            <a:ext cx="7311226" cy="6035040"/>
-          </a:xfrm>
-          <a:prstGeom prst="rect">
-            <a:avLst/>
-          </a:prstGeom>
-        </p:spPr>
-      </p:pic>
-    </p:spTree>
-    <p:extLst>
-      <p:ext uri="{BB962C8B-B14F-4D97-AF65-F5344CB8AC3E}">
-        <p14:creationId xmlns:p14="http://schemas.microsoft.com/office/powerpoint/2010/main" val="1895960851"/>
-      </p:ext>
-    </p:extLst>
-  </p:cSld>
-  <p:clrMapOvr>
-    <a:masterClrMapping/>
-  </p:clrMapOvr>
-</p:sld>
-</file>
-
-<file path=ppt/slides/slide11.xml><?xml version="1.0" encoding="utf-8"?>
-<p:sld xmlns:a="http://schemas.openxmlformats.org/drawingml/2006/main" xmlns:r="http://schemas.openxmlformats.org/officeDocument/2006/relationships" xmlns:p="http://schemas.openxmlformats.org/presentationml/2006/main">
-  <p:cSld>
-    <p:bg>
-      <p:bgPr>
-        <a:solidFill>
-          <a:schemeClr val="bg1"/>
-        </a:solidFill>
-        <a:effectLst/>
-      </p:bgPr>
-    </p:bg>
-    <p:spTree>
-      <p:nvGrpSpPr>
-        <p:cNvPr id="1" name=""/>
-        <p:cNvGrpSpPr/>
-        <p:nvPr/>
-      </p:nvGrpSpPr>
-      <p:grpSpPr>
-        <a:xfrm>
-          <a:off x="0" y="0"/>
-          <a:ext cx="0" cy="0"/>
-          <a:chOff x="0" y="0"/>
-          <a:chExt cx="0" cy="0"/>
-        </a:xfrm>
-      </p:grpSpPr>
-      <p:sp useBgFill="1">
-        <p:nvSpPr>
           <p:cNvPr id="21" name="Rectangle 20">
             <a:extLst>
               <a:ext uri="{FF2B5EF4-FFF2-40B4-BE49-F238E27FC236}">
@@ -6390,7 +6009,7 @@
 </p:sld>
 </file>
 
-<file path=ppt/slides/slide12.xml><?xml version="1.0" encoding="utf-8"?>
+<file path=ppt/slides/slide11.xml><?xml version="1.0" encoding="utf-8"?>
 <p:sld xmlns:a="http://schemas.openxmlformats.org/drawingml/2006/main" xmlns:r="http://schemas.openxmlformats.org/officeDocument/2006/relationships" xmlns:p="http://schemas.openxmlformats.org/presentationml/2006/main">
   <p:cSld>
     <p:bg>
@@ -6817,7 +6436,7 @@
 </p:sld>
 </file>
 
-<file path=ppt/slides/slide13.xml><?xml version="1.0" encoding="utf-8"?>
+<file path=ppt/slides/slide12.xml><?xml version="1.0" encoding="utf-8"?>
 <p:sld xmlns:a="http://schemas.openxmlformats.org/drawingml/2006/main" xmlns:r="http://schemas.openxmlformats.org/officeDocument/2006/relationships" xmlns:p="http://schemas.openxmlformats.org/presentationml/2006/main">
   <p:cSld>
     <p:bg>
@@ -7497,8 +7116,8 @@
               </a:lnSpc>
             </a:pPr>
             <a:r>
-              <a:rPr lang="en-US" sz="1400"/>
-              <a:t>I compared 3 different regression models and an ensemble method to determine which approach produced accurate results of predicting the number of offers a schools received.</a:t>
+              <a:rPr lang="en-US" sz="1400" dirty="0"/>
+              <a:t>I compared 3 different regression models and an ensemble method to determine which approach produced accurate results of predicting the number of offers a school received.</a:t>
             </a:r>
           </a:p>
           <a:p>
@@ -7508,8 +7127,16 @@
               </a:lnSpc>
             </a:pPr>
             <a:r>
-              <a:rPr lang="en-US" sz="1400"/>
-              <a:t>I determined that the ensemble method’s (Voting) 3% increase in accuracy wasn’t worth the trade off of more time/complexity of the simpler linear regression (OLS).</a:t>
+              <a:rPr lang="en-US" sz="1400" dirty="0"/>
+              <a:t>I determined that the ensemble method’s (Voting) 3% increase in R</a:t>
+            </a:r>
+            <a:r>
+              <a:rPr lang="en-US" sz="1400" baseline="30000" dirty="0"/>
+              <a:t>2</a:t>
+            </a:r>
+            <a:r>
+              <a:rPr lang="en-US" sz="1400" dirty="0"/>
+              <a:t> (0.96 vs 0.93) wasn’t worth the trade off of more time/complexity of the simpler linear regression (OLS).</a:t>
             </a:r>
           </a:p>
         </p:txBody>
@@ -7564,7 +7191,7 @@
 </p:sld>
 </file>
 
-<file path=ppt/slides/slide14.xml><?xml version="1.0" encoding="utf-8"?>
+<file path=ppt/slides/slide13.xml><?xml version="1.0" encoding="utf-8"?>
 <p:sld xmlns:a="http://schemas.openxmlformats.org/drawingml/2006/main" xmlns:r="http://schemas.openxmlformats.org/officeDocument/2006/relationships" xmlns:p="http://schemas.openxmlformats.org/presentationml/2006/main">
   <p:cSld>
     <p:bg>
@@ -8287,7 +7914,7 @@
 </p:sld>
 </file>
 
-<file path=ppt/slides/slide15.xml><?xml version="1.0" encoding="utf-8"?>
+<file path=ppt/slides/slide14.xml><?xml version="1.0" encoding="utf-8"?>
 <p:sld xmlns:a="http://schemas.openxmlformats.org/drawingml/2006/main" xmlns:r="http://schemas.openxmlformats.org/officeDocument/2006/relationships" xmlns:p="http://schemas.openxmlformats.org/presentationml/2006/main">
   <p:cSld>
     <p:bg>
@@ -8695,7 +8322,7 @@
 </p:sld>
 </file>
 
-<file path=ppt/slides/slide16.xml><?xml version="1.0" encoding="utf-8"?>
+<file path=ppt/slides/slide15.xml><?xml version="1.0" encoding="utf-8"?>
 <p:sld xmlns:a="http://schemas.openxmlformats.org/drawingml/2006/main" xmlns:r="http://schemas.openxmlformats.org/officeDocument/2006/relationships" xmlns:p="http://schemas.openxmlformats.org/presentationml/2006/main">
   <p:cSld>
     <p:bg>
@@ -9419,7 +9046,7 @@
 </p:sld>
 </file>
 
-<file path=ppt/slides/slide17.xml><?xml version="1.0" encoding="utf-8"?>
+<file path=ppt/slides/slide16.xml><?xml version="1.0" encoding="utf-8"?>
 <p:sld xmlns:a="http://schemas.openxmlformats.org/drawingml/2006/main" xmlns:r="http://schemas.openxmlformats.org/officeDocument/2006/relationships" xmlns:p="http://schemas.openxmlformats.org/presentationml/2006/main">
   <p:cSld>
     <p:bg>
@@ -9811,7 +9438,7 @@
 </p:sld>
 </file>
 
-<file path=ppt/slides/slide18.xml><?xml version="1.0" encoding="utf-8"?>
+<file path=ppt/slides/slide17.xml><?xml version="1.0" encoding="utf-8"?>
 <p:sld xmlns:a="http://schemas.openxmlformats.org/drawingml/2006/main" xmlns:r="http://schemas.openxmlformats.org/officeDocument/2006/relationships" xmlns:p="http://schemas.openxmlformats.org/presentationml/2006/main">
   <p:cSld>
     <p:bg>
@@ -10379,7 +10006,7 @@
       </p:grpSpPr>
       <p:sp useBgFill="1">
         <p:nvSpPr>
-          <p:cNvPr id="17" name="Rectangle 16">
+          <p:cNvPr id="39" name="Rectangle 25">
             <a:extLst>
               <a:ext uri="{FF2B5EF4-FFF2-40B4-BE49-F238E27FC236}">
                 <a16:creationId xmlns:a16="http://schemas.microsoft.com/office/drawing/2014/main" id="{CBB2B1F0-0DD6-4744-9A46-7A344FB48E40}"/>
@@ -10474,7 +10101,7 @@
       </p:sp>
       <p:sp>
         <p:nvSpPr>
-          <p:cNvPr id="19" name="Rectangle 18">
+          <p:cNvPr id="40" name="Rectangle 27">
             <a:extLst>
               <a:ext uri="{FF2B5EF4-FFF2-40B4-BE49-F238E27FC236}">
                 <a16:creationId xmlns:a16="http://schemas.microsoft.com/office/drawing/2014/main" id="{7A0B5DEA-ADF6-4BA5-9307-147F0A4685A0}"/>
@@ -10570,7 +10197,7 @@
       </p:sp>
       <p:sp>
         <p:nvSpPr>
-          <p:cNvPr id="21" name="Rectangle 20">
+          <p:cNvPr id="41" name="Rectangle 29">
             <a:extLst>
               <a:ext uri="{FF2B5EF4-FFF2-40B4-BE49-F238E27FC236}">
                 <a16:creationId xmlns:a16="http://schemas.microsoft.com/office/drawing/2014/main" id="{9DECDBF4-02B6-4BB4-B65B-B8107AD6A9E8}"/>
@@ -10689,22 +10316,16 @@
           <a:lstStyle/>
           <a:p>
             <a:r>
-              <a:rPr lang="en-US" sz="2000" dirty="0"/>
+              <a:rPr lang="en-US" sz="2000"/>
               <a:t>Performance on the Specialized High School Admissions Test (SHSAT) determines eligibility to one of the eight specialized high schools in New York City.</a:t>
             </a:r>
           </a:p>
           <a:p>
             <a:r>
-              <a:rPr lang="en-US" sz="2000" dirty="0"/>
-              <a:t>Of major concern is the racial &amp; ethnic breakdown of admitted students, showing significant underrepresentation from Black and Latinx students.</a:t>
+              <a:rPr lang="en-US" sz="2000"/>
+              <a:t>Black &amp; Latinx student representation is significantly lower, than other race &amp; ethnicities, amongst the specialized high school admitted students, given the demographics of NYC.</a:t>
             </a:r>
-          </a:p>
-          <a:p>
-            <a:pPr lvl="1"/>
-            <a:r>
-              <a:rPr lang="en-US"/>
-              <a:t>This is especially apparent given the percentage of NYC that is represented by Black &amp; Latinx residents. </a:t>
-            </a:r>
+            <a:endParaRPr lang="en-US" sz="2000" dirty="0"/>
           </a:p>
         </p:txBody>
       </p:sp>
@@ -10835,7 +10456,7 @@
           <a:lstStyle/>
           <a:p>
             <a:r>
-              <a:rPr lang="en-US" sz="6000"/>
+              <a:rPr lang="en-US" sz="6000" dirty="0"/>
               <a:t>Problem</a:t>
             </a:r>
           </a:p>
@@ -11059,8 +10680,9 @@
           <a:p>
             <a:r>
               <a:rPr lang="en-US" sz="2000" dirty="0"/>
-              <a:t>What factors not only predict the number of specialized high school admissions offers received by students, across the board, but specifically for Black &amp; Latinx students?</a:t>
+              <a:t>Which factors that predict success on the SHSAT can increase the number of specialized high school admissions offers received by Black &amp; Latinx students? </a:t>
             </a:r>
+            <a:endParaRPr lang="en-US" sz="1600" dirty="0"/>
           </a:p>
         </p:txBody>
       </p:sp>
@@ -11419,7 +11041,7 @@
               </a:lnSpc>
             </a:pPr>
             <a:r>
-              <a:rPr lang="en-US" sz="1900"/>
+              <a:rPr lang="en-US" sz="1900" dirty="0"/>
               <a:t>Two main datasets are used:</a:t>
             </a:r>
           </a:p>
@@ -11430,7 +11052,7 @@
               </a:lnSpc>
             </a:pPr>
             <a:r>
-              <a:rPr lang="en-US" sz="1900"/>
+              <a:rPr lang="en-US" sz="1900" dirty="0"/>
               <a:t>2016 School Explorer</a:t>
             </a:r>
           </a:p>
@@ -11441,17 +11063,17 @@
               </a:lnSpc>
             </a:pPr>
             <a:r>
-              <a:rPr lang="en-US" sz="1900"/>
+              <a:rPr lang="en-US" sz="1900" dirty="0"/>
               <a:t>Consists of 1,272 schools in New York City, and 161 variables, provided via </a:t>
             </a:r>
             <a:r>
-              <a:rPr lang="en-US" sz="1900">
+              <a:rPr lang="en-US" sz="1900" dirty="0">
                 <a:hlinkClick r:id="rId2"/>
               </a:rPr>
               <a:t>Kaggle</a:t>
             </a:r>
             <a:r>
-              <a:rPr lang="en-US" sz="1900"/>
+              <a:rPr lang="en-US" sz="1900" dirty="0"/>
               <a:t>.</a:t>
             </a:r>
           </a:p>
@@ -11462,8 +11084,8 @@
               </a:lnSpc>
             </a:pPr>
             <a:r>
-              <a:rPr lang="en-US" sz="1900"/>
-              <a:t>Primarily, it’s school descriptors, e.g. grades, race &amp; ethnicity student percentages, high/low performing percentages of students.</a:t>
+              <a:rPr lang="en-US" sz="1900" dirty="0"/>
+              <a:t>Primarily, it’s school descriptors, e.g. grades, race &amp; ethnicity demographics percentages, high/low performing percentages of students.</a:t>
             </a:r>
           </a:p>
           <a:p>
@@ -11473,7 +11095,7 @@
               </a:lnSpc>
             </a:pPr>
             <a:r>
-              <a:rPr lang="en-US" sz="1900"/>
+              <a:rPr lang="en-US" sz="1900" dirty="0"/>
               <a:t>2017-2018 SHSAT Admissions Test Offers By Sending School</a:t>
             </a:r>
           </a:p>
@@ -11484,29 +11106,18 @@
               </a:lnSpc>
             </a:pPr>
             <a:r>
-              <a:rPr lang="en-US" sz="1900"/>
-              <a:t>Consists of the 2017 SHSAT results, available via NYC’s </a:t>
+              <a:rPr lang="en-US" sz="1900" dirty="0"/>
+              <a:t>Consists of school-level count of admissions offers based on the 2017 SHSAT, available via NYC’s </a:t>
             </a:r>
             <a:r>
-              <a:rPr lang="en-US" sz="1900">
+              <a:rPr lang="en-US" sz="1900" dirty="0">
                 <a:hlinkClick r:id="rId3"/>
               </a:rPr>
               <a:t>Open Data Portal</a:t>
             </a:r>
             <a:r>
-              <a:rPr lang="en-US" sz="1900"/>
+              <a:rPr lang="en-US" sz="1900" dirty="0"/>
               <a:t>. </a:t>
-            </a:r>
-          </a:p>
-          <a:p>
-            <a:pPr lvl="2">
-              <a:lnSpc>
-                <a:spcPct val="100000"/>
-              </a:lnSpc>
-            </a:pPr>
-            <a:r>
-              <a:rPr lang="en-US" sz="1900"/>
-              <a:t>All test takers are 28,000+, grade 8 students, grouped by school.</a:t>
             </a:r>
           </a:p>
           <a:p>
@@ -11515,15 +11126,7 @@
                 <a:spcPct val="100000"/>
               </a:lnSpc>
             </a:pPr>
-            <a:endParaRPr lang="en-US" sz="1900"/>
-          </a:p>
-          <a:p>
-            <a:pPr>
-              <a:lnSpc>
-                <a:spcPct val="100000"/>
-              </a:lnSpc>
-            </a:pPr>
-            <a:endParaRPr lang="en-US" sz="1900"/>
+            <a:endParaRPr lang="en-US" sz="1900" dirty="0"/>
           </a:p>
         </p:txBody>
       </p:sp>
@@ -11567,10 +11170,10 @@
       </p:grpSpPr>
       <p:sp useBgFill="1">
         <p:nvSpPr>
-          <p:cNvPr id="8" name="Rectangle 7">
-            <a:extLst>
-              <a:ext uri="{FF2B5EF4-FFF2-40B4-BE49-F238E27FC236}">
-                <a16:creationId xmlns:a16="http://schemas.microsoft.com/office/drawing/2014/main" id="{CBB2B1F0-0DD6-4744-9A46-7A344FB48E40}"/>
+          <p:cNvPr id="9" name="Rectangle 8">
+            <a:extLst>
+              <a:ext uri="{FF2B5EF4-FFF2-40B4-BE49-F238E27FC236}">
+                <a16:creationId xmlns:a16="http://schemas.microsoft.com/office/drawing/2014/main" id="{8380AD67-C5CA-4918-B4BB-C359BB03EEDD}"/>
               </a:ext>
               <a:ext uri="{C183D7F6-B498-43B3-948B-1728B52AA6E4}">
                 <adec:decorative xmlns:adec="http://schemas.microsoft.com/office/drawing/2017/decorative" val="1"/>
@@ -11630,7 +11233,7 @@
           <p:cNvPr id="2" name="Title 1">
             <a:extLst>
               <a:ext uri="{FF2B5EF4-FFF2-40B4-BE49-F238E27FC236}">
-                <a16:creationId xmlns:a16="http://schemas.microsoft.com/office/drawing/2014/main" id="{874A4C2B-DC95-F44F-B77F-F5F05821C7EE}"/>
+                <a16:creationId xmlns:a16="http://schemas.microsoft.com/office/drawing/2014/main" id="{DCC5BE86-6828-5149-8BED-A7EB2BBDDAF5}"/>
               </a:ext>
             </a:extLst>
           </p:cNvPr>
@@ -11643,8 +11246,8 @@
         </p:nvSpPr>
         <p:spPr>
           <a:xfrm>
-            <a:off x="841248" y="426720"/>
-            <a:ext cx="10506456" cy="1919141"/>
+            <a:off x="5080216" y="1076324"/>
+            <a:ext cx="6272784" cy="1535051"/>
           </a:xfrm>
         </p:spPr>
         <p:txBody>
@@ -11654,18 +11257,47 @@
           <a:lstStyle/>
           <a:p>
             <a:r>
-              <a:rPr lang="en-US" sz="6000"/>
-              <a:t>Approach &amp; Method</a:t>
+              <a:rPr lang="en-US" sz="4800" dirty="0"/>
+              <a:t>Feature Engineering</a:t>
             </a:r>
           </a:p>
         </p:txBody>
       </p:sp>
-      <p:sp>
-        <p:nvSpPr>
-          <p:cNvPr id="10" name="Rectangle 9">
-            <a:extLst>
-              <a:ext uri="{FF2B5EF4-FFF2-40B4-BE49-F238E27FC236}">
-                <a16:creationId xmlns:a16="http://schemas.microsoft.com/office/drawing/2014/main" id="{7A0B5DEA-ADF6-4BA5-9307-147F0A4685A0}"/>
+      <p:pic>
+        <p:nvPicPr>
+          <p:cNvPr id="5" name="Picture 4">
+            <a:extLst>
+              <a:ext uri="{FF2B5EF4-FFF2-40B4-BE49-F238E27FC236}">
+                <a16:creationId xmlns:a16="http://schemas.microsoft.com/office/drawing/2014/main" id="{D453D521-5B34-4AC8-9EBF-44BC050E2C49}"/>
+              </a:ext>
+            </a:extLst>
+          </p:cNvPr>
+          <p:cNvPicPr>
+            <a:picLocks noChangeAspect="1"/>
+          </p:cNvPicPr>
+          <p:nvPr/>
+        </p:nvPicPr>
+        <p:blipFill rotWithShape="1">
+          <a:blip r:embed="rId2"/>
+          <a:srcRect l="51928" r="7670"/>
+          <a:stretch/>
+        </p:blipFill>
+        <p:spPr>
+          <a:xfrm>
+            <a:off x="20" y="10"/>
+            <a:ext cx="4505305" cy="6857990"/>
+          </a:xfrm>
+          <a:prstGeom prst="rect">
+            <a:avLst/>
+          </a:prstGeom>
+        </p:spPr>
+      </p:pic>
+      <p:sp>
+        <p:nvSpPr>
+          <p:cNvPr id="11" name="Rectangle 10">
+            <a:extLst>
+              <a:ext uri="{FF2B5EF4-FFF2-40B4-BE49-F238E27FC236}">
+                <a16:creationId xmlns:a16="http://schemas.microsoft.com/office/drawing/2014/main" id="{EABAD4DA-87BA-4F70-9EF0-45C6BCF17823}"/>
               </a:ext>
               <a:ext uri="{C183D7F6-B498-43B3-948B-1728B52AA6E4}">
                 <adec:decorative xmlns:adec="http://schemas.microsoft.com/office/drawing/2017/decorative" val="1"/>
@@ -11684,23 +11316,19 @@
           </p:nvPr>
         </p:nvSpPr>
         <p:spPr>
-          <a:xfrm>
-            <a:off x="868680" y="2898648"/>
-            <a:ext cx="10506456" cy="18288"/>
+          <a:xfrm rot="5400000">
+            <a:off x="5317960" y="363389"/>
+            <a:ext cx="73152" cy="548640"/>
           </a:xfrm>
           <a:prstGeom prst="rect">
             <a:avLst/>
           </a:prstGeom>
           <a:solidFill>
-            <a:schemeClr val="tx2">
-              <a:lumMod val="25000"/>
-              <a:lumOff val="75000"/>
-            </a:schemeClr>
+            <a:schemeClr val="accent1"/>
           </a:solidFill>
-          <a:ln w="3175">
+          <a:ln>
             <a:noFill/>
           </a:ln>
-          <a:effectLst/>
         </p:spPr>
         <p:style>
           <a:lnRef idx="2">
@@ -11758,10 +11386,10 @@
       </p:sp>
       <p:sp>
         <p:nvSpPr>
-          <p:cNvPr id="12" name="Rectangle 11">
-            <a:extLst>
-              <a:ext uri="{FF2B5EF4-FFF2-40B4-BE49-F238E27FC236}">
-                <a16:creationId xmlns:a16="http://schemas.microsoft.com/office/drawing/2014/main" id="{9DECDBF4-02B6-4BB4-B65B-B8107AD6A9E8}"/>
+          <p:cNvPr id="13" name="Rectangle 12">
+            <a:extLst>
+              <a:ext uri="{FF2B5EF4-FFF2-40B4-BE49-F238E27FC236}">
+                <a16:creationId xmlns:a16="http://schemas.microsoft.com/office/drawing/2014/main" id="{915128D9-2797-47FA-B6FE-EC24E6B8437A}"/>
               </a:ext>
               <a:ext uri="{C183D7F6-B498-43B3-948B-1728B52AA6E4}">
                 <adec:decorative xmlns:adec="http://schemas.microsoft.com/office/drawing/2017/decorative" val="1"/>
@@ -11780,19 +11408,23 @@
           </p:nvPr>
         </p:nvSpPr>
         <p:spPr>
-          <a:xfrm flipV="1">
-            <a:off x="841248" y="2783982"/>
-            <a:ext cx="1873457" cy="137160"/>
+          <a:xfrm>
+            <a:off x="5099266" y="2935541"/>
+            <a:ext cx="6217920" cy="18288"/>
           </a:xfrm>
           <a:prstGeom prst="rect">
             <a:avLst/>
           </a:prstGeom>
           <a:solidFill>
-            <a:schemeClr val="accent1"/>
+            <a:schemeClr val="tx2">
+              <a:lumMod val="25000"/>
+              <a:lumOff val="75000"/>
+            </a:schemeClr>
           </a:solidFill>
-          <a:ln>
+          <a:ln w="3175">
             <a:noFill/>
           </a:ln>
+          <a:effectLst/>
         </p:spPr>
         <p:style>
           <a:lnRef idx="2">
@@ -11853,397 +11485,6 @@
           <p:cNvPr id="3" name="Content Placeholder 2">
             <a:extLst>
               <a:ext uri="{FF2B5EF4-FFF2-40B4-BE49-F238E27FC236}">
-                <a16:creationId xmlns:a16="http://schemas.microsoft.com/office/drawing/2014/main" id="{1B3F1E97-8652-2F4C-9A17-7D73C182066B}"/>
-              </a:ext>
-            </a:extLst>
-          </p:cNvPr>
-          <p:cNvSpPr>
-            <a:spLocks noGrp="1"/>
-          </p:cNvSpPr>
-          <p:nvPr>
-            <p:ph idx="1"/>
-          </p:nvPr>
-        </p:nvSpPr>
-        <p:spPr>
-          <a:xfrm>
-            <a:off x="841248" y="3337269"/>
-            <a:ext cx="10509504" cy="2905686"/>
-          </a:xfrm>
-        </p:spPr>
-        <p:txBody>
-          <a:bodyPr>
-            <a:normAutofit/>
-          </a:bodyPr>
-          <a:lstStyle/>
-          <a:p>
-            <a:r>
-              <a:rPr lang="en-US" sz="2000"/>
-              <a:t>The goal of this analysis is to elicit which factors predict performance on the SHSAT. These factors will serve as beacons to direct or draw services, whether education-based or otherwise, towards improving the percentage of Black and Latinx students admitted to the specialized high schools.</a:t>
-            </a:r>
-          </a:p>
-          <a:p>
-            <a:r>
-              <a:rPr lang="en-US" sz="2000"/>
-              <a:t>As a bit of forecasting, I'll use linear regression models to determine how many admissions offers schools, that fit a certain testing aptitude standard could be getting, based on their standardized (yearly) testing scores.</a:t>
-            </a:r>
-          </a:p>
-        </p:txBody>
-      </p:sp>
-    </p:spTree>
-    <p:extLst>
-      <p:ext uri="{BB962C8B-B14F-4D97-AF65-F5344CB8AC3E}">
-        <p14:creationId xmlns:p14="http://schemas.microsoft.com/office/powerpoint/2010/main" val="2136526382"/>
-      </p:ext>
-    </p:extLst>
-  </p:cSld>
-  <p:clrMapOvr>
-    <a:masterClrMapping/>
-  </p:clrMapOvr>
-</p:sld>
-</file>
-
-<file path=ppt/slides/slide6.xml><?xml version="1.0" encoding="utf-8"?>
-<p:sld xmlns:a="http://schemas.openxmlformats.org/drawingml/2006/main" xmlns:r="http://schemas.openxmlformats.org/officeDocument/2006/relationships" xmlns:p="http://schemas.openxmlformats.org/presentationml/2006/main">
-  <p:cSld>
-    <p:bg>
-      <p:bgPr>
-        <a:solidFill>
-          <a:schemeClr val="bg1"/>
-        </a:solidFill>
-        <a:effectLst/>
-      </p:bgPr>
-    </p:bg>
-    <p:spTree>
-      <p:nvGrpSpPr>
-        <p:cNvPr id="1" name=""/>
-        <p:cNvGrpSpPr/>
-        <p:nvPr/>
-      </p:nvGrpSpPr>
-      <p:grpSpPr>
-        <a:xfrm>
-          <a:off x="0" y="0"/>
-          <a:ext cx="0" cy="0"/>
-          <a:chOff x="0" y="0"/>
-          <a:chExt cx="0" cy="0"/>
-        </a:xfrm>
-      </p:grpSpPr>
-      <p:sp useBgFill="1">
-        <p:nvSpPr>
-          <p:cNvPr id="9" name="Rectangle 8">
-            <a:extLst>
-              <a:ext uri="{FF2B5EF4-FFF2-40B4-BE49-F238E27FC236}">
-                <a16:creationId xmlns:a16="http://schemas.microsoft.com/office/drawing/2014/main" id="{8380AD67-C5CA-4918-B4BB-C359BB03EEDD}"/>
-              </a:ext>
-              <a:ext uri="{C183D7F6-B498-43B3-948B-1728B52AA6E4}">
-                <adec:decorative xmlns:adec="http://schemas.microsoft.com/office/drawing/2017/decorative" val="1"/>
-              </a:ext>
-            </a:extLst>
-          </p:cNvPr>
-          <p:cNvSpPr>
-            <a:spLocks noGrp="1" noRot="1" noChangeAspect="1" noMove="1" noResize="1" noEditPoints="1" noAdjustHandles="1" noChangeArrowheads="1" noChangeShapeType="1" noTextEdit="1"/>
-          </p:cNvSpPr>
-          <p:nvPr>
-            <p:extLst>
-              <p:ext uri="{386F3935-93C4-4BCD-93E2-E3B085C9AB24}">
-                <p16:designElem xmlns:p16="http://schemas.microsoft.com/office/powerpoint/2015/main" val="1"/>
-              </p:ext>
-            </p:extLst>
-          </p:nvPr>
-        </p:nvSpPr>
-        <p:spPr>
-          <a:xfrm>
-            <a:off x="0" y="0"/>
-            <a:ext cx="12192000" cy="6858000"/>
-          </a:xfrm>
-          <a:prstGeom prst="rect">
-            <a:avLst/>
-          </a:prstGeom>
-          <a:ln>
-            <a:noFill/>
-          </a:ln>
-        </p:spPr>
-        <p:style>
-          <a:lnRef idx="2">
-            <a:schemeClr val="accent1">
-              <a:shade val="50000"/>
-            </a:schemeClr>
-          </a:lnRef>
-          <a:fillRef idx="1">
-            <a:schemeClr val="accent1"/>
-          </a:fillRef>
-          <a:effectRef idx="0">
-            <a:schemeClr val="accent1"/>
-          </a:effectRef>
-          <a:fontRef idx="minor">
-            <a:schemeClr val="lt1"/>
-          </a:fontRef>
-        </p:style>
-        <p:txBody>
-          <a:bodyPr rtlCol="0" anchor="ctr"/>
-          <a:lstStyle/>
-          <a:p>
-            <a:pPr algn="ctr"/>
-            <a:endParaRPr lang="en-US"/>
-          </a:p>
-        </p:txBody>
-      </p:sp>
-      <p:sp>
-        <p:nvSpPr>
-          <p:cNvPr id="2" name="Title 1">
-            <a:extLst>
-              <a:ext uri="{FF2B5EF4-FFF2-40B4-BE49-F238E27FC236}">
-                <a16:creationId xmlns:a16="http://schemas.microsoft.com/office/drawing/2014/main" id="{DCC5BE86-6828-5149-8BED-A7EB2BBDDAF5}"/>
-              </a:ext>
-            </a:extLst>
-          </p:cNvPr>
-          <p:cNvSpPr>
-            <a:spLocks noGrp="1"/>
-          </p:cNvSpPr>
-          <p:nvPr>
-            <p:ph type="title"/>
-          </p:nvPr>
-        </p:nvSpPr>
-        <p:spPr>
-          <a:xfrm>
-            <a:off x="5080216" y="1076324"/>
-            <a:ext cx="6272784" cy="1535051"/>
-          </a:xfrm>
-        </p:spPr>
-        <p:txBody>
-          <a:bodyPr anchor="b">
-            <a:normAutofit/>
-          </a:bodyPr>
-          <a:lstStyle/>
-          <a:p>
-            <a:r>
-              <a:rPr lang="en-US" sz="4800"/>
-              <a:t>Data Status &amp; Feature Engineering</a:t>
-            </a:r>
-          </a:p>
-        </p:txBody>
-      </p:sp>
-      <p:pic>
-        <p:nvPicPr>
-          <p:cNvPr id="5" name="Picture 4">
-            <a:extLst>
-              <a:ext uri="{FF2B5EF4-FFF2-40B4-BE49-F238E27FC236}">
-                <a16:creationId xmlns:a16="http://schemas.microsoft.com/office/drawing/2014/main" id="{D453D521-5B34-4AC8-9EBF-44BC050E2C49}"/>
-              </a:ext>
-            </a:extLst>
-          </p:cNvPr>
-          <p:cNvPicPr>
-            <a:picLocks noChangeAspect="1"/>
-          </p:cNvPicPr>
-          <p:nvPr/>
-        </p:nvPicPr>
-        <p:blipFill rotWithShape="1">
-          <a:blip r:embed="rId2"/>
-          <a:srcRect l="51928" r="7670"/>
-          <a:stretch/>
-        </p:blipFill>
-        <p:spPr>
-          <a:xfrm>
-            <a:off x="20" y="10"/>
-            <a:ext cx="4505305" cy="6857990"/>
-          </a:xfrm>
-          <a:prstGeom prst="rect">
-            <a:avLst/>
-          </a:prstGeom>
-        </p:spPr>
-      </p:pic>
-      <p:sp>
-        <p:nvSpPr>
-          <p:cNvPr id="11" name="Rectangle 10">
-            <a:extLst>
-              <a:ext uri="{FF2B5EF4-FFF2-40B4-BE49-F238E27FC236}">
-                <a16:creationId xmlns:a16="http://schemas.microsoft.com/office/drawing/2014/main" id="{EABAD4DA-87BA-4F70-9EF0-45C6BCF17823}"/>
-              </a:ext>
-              <a:ext uri="{C183D7F6-B498-43B3-948B-1728B52AA6E4}">
-                <adec:decorative xmlns:adec="http://schemas.microsoft.com/office/drawing/2017/decorative" val="1"/>
-              </a:ext>
-            </a:extLst>
-          </p:cNvPr>
-          <p:cNvSpPr>
-            <a:spLocks noGrp="1" noRot="1" noChangeAspect="1" noMove="1" noResize="1" noEditPoints="1" noAdjustHandles="1" noChangeArrowheads="1" noChangeShapeType="1" noTextEdit="1"/>
-          </p:cNvSpPr>
-          <p:nvPr>
-            <p:extLst>
-              <p:ext uri="{386F3935-93C4-4BCD-93E2-E3B085C9AB24}">
-                <p16:designElem xmlns:p16="http://schemas.microsoft.com/office/powerpoint/2015/main" val="1"/>
-              </p:ext>
-            </p:extLst>
-          </p:nvPr>
-        </p:nvSpPr>
-        <p:spPr>
-          <a:xfrm rot="5400000">
-            <a:off x="5317960" y="363389"/>
-            <a:ext cx="73152" cy="548640"/>
-          </a:xfrm>
-          <a:prstGeom prst="rect">
-            <a:avLst/>
-          </a:prstGeom>
-          <a:solidFill>
-            <a:schemeClr val="accent1"/>
-          </a:solidFill>
-          <a:ln>
-            <a:noFill/>
-          </a:ln>
-        </p:spPr>
-        <p:style>
-          <a:lnRef idx="2">
-            <a:schemeClr val="accent1">
-              <a:shade val="50000"/>
-            </a:schemeClr>
-          </a:lnRef>
-          <a:fillRef idx="1">
-            <a:schemeClr val="accent1"/>
-          </a:fillRef>
-          <a:effectRef idx="0">
-            <a:schemeClr val="accent1"/>
-          </a:effectRef>
-          <a:fontRef idx="minor">
-            <a:schemeClr val="lt1"/>
-          </a:fontRef>
-        </p:style>
-        <p:txBody>
-          <a:bodyPr rtlCol="0" anchor="ctr"/>
-          <a:lstStyle/>
-          <a:p>
-            <a:pPr marL="0" marR="0" lvl="0" indent="0" algn="ctr" defTabSz="914400" rtl="0" eaLnBrk="1" fontAlgn="auto" latinLnBrk="0" hangingPunct="1">
-              <a:lnSpc>
-                <a:spcPct val="100000"/>
-              </a:lnSpc>
-              <a:spcBef>
-                <a:spcPts val="0"/>
-              </a:spcBef>
-              <a:spcAft>
-                <a:spcPts val="0"/>
-              </a:spcAft>
-              <a:buClrTx/>
-              <a:buSzTx/>
-              <a:buFontTx/>
-              <a:buNone/>
-              <a:tabLst/>
-              <a:defRPr/>
-            </a:pPr>
-            <a:endParaRPr kumimoji="0" lang="en-US" sz="1800" b="0" i="0" u="none" strike="noStrike" kern="1200" cap="none" spc="0" normalizeH="0" baseline="0" noProof="0">
-              <a:ln>
-                <a:noFill/>
-              </a:ln>
-              <a:solidFill>
-                <a:prstClr val="white"/>
-              </a:solidFill>
-              <a:effectLst/>
-              <a:uLnTx/>
-              <a:uFillTx/>
-              <a:latin typeface="Calibri" panose="020F0502020204030204"/>
-              <a:ea typeface="+mn-ea"/>
-              <a:cs typeface="+mn-cs"/>
-            </a:endParaRPr>
-          </a:p>
-        </p:txBody>
-      </p:sp>
-      <p:sp>
-        <p:nvSpPr>
-          <p:cNvPr id="13" name="Rectangle 12">
-            <a:extLst>
-              <a:ext uri="{FF2B5EF4-FFF2-40B4-BE49-F238E27FC236}">
-                <a16:creationId xmlns:a16="http://schemas.microsoft.com/office/drawing/2014/main" id="{915128D9-2797-47FA-B6FE-EC24E6B8437A}"/>
-              </a:ext>
-              <a:ext uri="{C183D7F6-B498-43B3-948B-1728B52AA6E4}">
-                <adec:decorative xmlns:adec="http://schemas.microsoft.com/office/drawing/2017/decorative" val="1"/>
-              </a:ext>
-            </a:extLst>
-          </p:cNvPr>
-          <p:cNvSpPr>
-            <a:spLocks noGrp="1" noRot="1" noChangeAspect="1" noMove="1" noResize="1" noEditPoints="1" noAdjustHandles="1" noChangeArrowheads="1" noChangeShapeType="1" noTextEdit="1"/>
-          </p:cNvSpPr>
-          <p:nvPr>
-            <p:extLst>
-              <p:ext uri="{386F3935-93C4-4BCD-93E2-E3B085C9AB24}">
-                <p16:designElem xmlns:p16="http://schemas.microsoft.com/office/powerpoint/2015/main" val="1"/>
-              </p:ext>
-            </p:extLst>
-          </p:nvPr>
-        </p:nvSpPr>
-        <p:spPr>
-          <a:xfrm>
-            <a:off x="5099266" y="2935541"/>
-            <a:ext cx="6217920" cy="18288"/>
-          </a:xfrm>
-          <a:prstGeom prst="rect">
-            <a:avLst/>
-          </a:prstGeom>
-          <a:solidFill>
-            <a:schemeClr val="tx2">
-              <a:lumMod val="25000"/>
-              <a:lumOff val="75000"/>
-            </a:schemeClr>
-          </a:solidFill>
-          <a:ln w="3175">
-            <a:noFill/>
-          </a:ln>
-          <a:effectLst/>
-        </p:spPr>
-        <p:style>
-          <a:lnRef idx="2">
-            <a:schemeClr val="accent1">
-              <a:shade val="50000"/>
-            </a:schemeClr>
-          </a:lnRef>
-          <a:fillRef idx="1">
-            <a:schemeClr val="accent1"/>
-          </a:fillRef>
-          <a:effectRef idx="0">
-            <a:schemeClr val="accent1"/>
-          </a:effectRef>
-          <a:fontRef idx="minor">
-            <a:schemeClr val="lt1"/>
-          </a:fontRef>
-        </p:style>
-        <p:txBody>
-          <a:bodyPr rtlCol="0" anchor="ctr"/>
-          <a:lstStyle/>
-          <a:p>
-            <a:pPr marL="0" marR="0" lvl="0" indent="0" algn="ctr" defTabSz="914400" rtl="0" eaLnBrk="1" fontAlgn="auto" latinLnBrk="0" hangingPunct="1">
-              <a:lnSpc>
-                <a:spcPct val="100000"/>
-              </a:lnSpc>
-              <a:spcBef>
-                <a:spcPts val="0"/>
-              </a:spcBef>
-              <a:spcAft>
-                <a:spcPts val="0"/>
-              </a:spcAft>
-              <a:buClrTx/>
-              <a:buSzTx/>
-              <a:buFontTx/>
-              <a:buNone/>
-              <a:tabLst/>
-              <a:defRPr/>
-            </a:pPr>
-            <a:endParaRPr kumimoji="0" lang="en-US" sz="1800" b="0" i="0" u="none" strike="noStrike" kern="1200" cap="none" spc="0" normalizeH="0" baseline="0" noProof="0">
-              <a:ln>
-                <a:noFill/>
-              </a:ln>
-              <a:solidFill>
-                <a:prstClr val="white"/>
-              </a:solidFill>
-              <a:effectLst/>
-              <a:uLnTx/>
-              <a:uFillTx/>
-              <a:latin typeface="Calibri" panose="020F0502020204030204"/>
-              <a:ea typeface="+mn-ea"/>
-              <a:cs typeface="+mn-cs"/>
-            </a:endParaRPr>
-          </a:p>
-        </p:txBody>
-      </p:sp>
-      <p:sp>
-        <p:nvSpPr>
-          <p:cNvPr id="3" name="Content Placeholder 2">
-            <a:extLst>
-              <a:ext uri="{FF2B5EF4-FFF2-40B4-BE49-F238E27FC236}">
                 <a16:creationId xmlns:a16="http://schemas.microsoft.com/office/drawing/2014/main" id="{331326CC-BF8A-1743-94D9-AB8F25F3EFB0}"/>
               </a:ext>
             </a:extLst>
@@ -12263,7 +11504,7 @@
         </p:spPr>
         <p:txBody>
           <a:bodyPr>
-            <a:normAutofit/>
+            <a:normAutofit lnSpcReduction="10000"/>
           </a:bodyPr>
           <a:lstStyle/>
           <a:p>
@@ -12274,15 +11515,18 @@
             </a:pPr>
             <a:r>
               <a:rPr lang="en-US" sz="1800" dirty="0"/>
-              <a:t>In order to better group the schools, several new features were created that account for scores on regularly </a:t>
+              <a:t>In order to improve the dimensionality of the data, several features were created </a:t>
             </a:r>
-            <a:r>
-              <a:rPr lang="en-US" sz="1800" dirty="0" err="1"/>
-              <a:t>adminitered</a:t>
-            </a:r>
+          </a:p>
+          <a:p>
+            <a:pPr>
+              <a:lnSpc>
+                <a:spcPct val="100000"/>
+              </a:lnSpc>
+            </a:pPr>
             <a:r>
               <a:rPr lang="en-US" sz="1800" dirty="0"/>
-              <a:t> standardized tests. </a:t>
+              <a:t>For example, scores on standardized tests that were in several columns were summarized into one: </a:t>
             </a:r>
           </a:p>
           <a:p>
@@ -12293,18 +11537,29 @@
             </a:pPr>
             <a:r>
               <a:rPr lang="en-US" sz="1800" dirty="0"/>
-              <a:t>This data is broken up into two kinds of information, ELA (English Language Arts) &amp; Math. Scoring on these tests top out at 4, with 1 representing the worst score.</a:t>
+              <a:t>Standardized test scores, for each grade, consisted of two kinds of information, ELA (English Language Arts) &amp; Math.</a:t>
             </a:r>
           </a:p>
           <a:p>
-            <a:pPr>
+            <a:pPr lvl="2">
+              <a:lnSpc>
+                <a:spcPct val="100000"/>
+              </a:lnSpc>
+            </a:pPr>
+            <a:r>
+              <a:rPr lang="en-US" sz="1600" dirty="0"/>
+              <a:t>Scoring on these tests top out at 4, with 1 representing the worst score.</a:t>
+            </a:r>
+          </a:p>
+          <a:p>
+            <a:pPr lvl="1">
               <a:lnSpc>
                 <a:spcPct val="100000"/>
               </a:lnSpc>
             </a:pPr>
             <a:r>
               <a:rPr lang="en-US" sz="1800" dirty="0"/>
-              <a:t>This allows us to better train the linear regression model on fewer features/variables.</a:t>
+              <a:t>These scores were averaged to the school level.</a:t>
             </a:r>
           </a:p>
         </p:txBody>
@@ -12322,7 +11577,7 @@
 </p:sld>
 </file>
 
-<file path=ppt/slides/slide7.xml><?xml version="1.0" encoding="utf-8"?>
+<file path=ppt/slides/slide6.xml><?xml version="1.0" encoding="utf-8"?>
 <p:sld xmlns:a="http://schemas.openxmlformats.org/drawingml/2006/main" xmlns:r="http://schemas.openxmlformats.org/officeDocument/2006/relationships" xmlns:p="http://schemas.openxmlformats.org/presentationml/2006/main">
   <p:cSld>
     <p:bg>
@@ -12998,13 +12253,13 @@
           <a:p>
             <a:r>
               <a:rPr lang="en-US" sz="1700" dirty="0"/>
-              <a:t>An initial assumption is that those students who perform well on standardized tests would equally perform well on the SHSAT.</a:t>
+              <a:t>An initial assumption is that students who perform well on standardized tests also perform well on the SHSAT.</a:t>
             </a:r>
           </a:p>
           <a:p>
             <a:r>
               <a:rPr lang="en-US" sz="1700" dirty="0"/>
-              <a:t>This breakdown may hint, on these limited criteria, why less Black &amp; Latinx students receive admissions offers.</a:t>
+              <a:t>This breakdown may hint as to why Black &amp; Latinx students receive less specialized high school admissions offers.</a:t>
             </a:r>
           </a:p>
         </p:txBody>
@@ -13052,7 +12307,7 @@
 </p:sld>
 </file>
 
-<file path=ppt/slides/slide8.xml><?xml version="1.0" encoding="utf-8"?>
+<file path=ppt/slides/slide7.xml><?xml version="1.0" encoding="utf-8"?>
 <p:sld xmlns:a="http://schemas.openxmlformats.org/drawingml/2006/main" xmlns:r="http://schemas.openxmlformats.org/officeDocument/2006/relationships" xmlns:p="http://schemas.openxmlformats.org/presentationml/2006/main">
   <p:cSld>
     <p:bg>
@@ -13479,7 +12734,7 @@
 </p:sld>
 </file>
 
-<file path=ppt/slides/slide9.xml><?xml version="1.0" encoding="utf-8"?>
+<file path=ppt/slides/slide8.xml><?xml version="1.0" encoding="utf-8"?>
 <p:sld xmlns:a="http://schemas.openxmlformats.org/drawingml/2006/main" xmlns:r="http://schemas.openxmlformats.org/officeDocument/2006/relationships" xmlns:p="http://schemas.openxmlformats.org/presentationml/2006/main">
   <p:cSld>
     <p:bg>
@@ -13857,6 +13112,391 @@
     <p:extLst>
       <p:ext uri="{BB962C8B-B14F-4D97-AF65-F5344CB8AC3E}">
         <p14:creationId xmlns:p14="http://schemas.microsoft.com/office/powerpoint/2010/main" val="2448766035"/>
+      </p:ext>
+    </p:extLst>
+  </p:cSld>
+  <p:clrMapOvr>
+    <a:masterClrMapping/>
+  </p:clrMapOvr>
+</p:sld>
+</file>
+
+<file path=ppt/slides/slide9.xml><?xml version="1.0" encoding="utf-8"?>
+<p:sld xmlns:a="http://schemas.openxmlformats.org/drawingml/2006/main" xmlns:r="http://schemas.openxmlformats.org/officeDocument/2006/relationships" xmlns:p="http://schemas.openxmlformats.org/presentationml/2006/main">
+  <p:cSld>
+    <p:bg>
+      <p:bgPr>
+        <a:solidFill>
+          <a:schemeClr val="bg1"/>
+        </a:solidFill>
+        <a:effectLst/>
+      </p:bgPr>
+    </p:bg>
+    <p:spTree>
+      <p:nvGrpSpPr>
+        <p:cNvPr id="1" name=""/>
+        <p:cNvGrpSpPr/>
+        <p:nvPr/>
+      </p:nvGrpSpPr>
+      <p:grpSpPr>
+        <a:xfrm>
+          <a:off x="0" y="0"/>
+          <a:ext cx="0" cy="0"/>
+          <a:chOff x="0" y="0"/>
+          <a:chExt cx="0" cy="0"/>
+        </a:xfrm>
+      </p:grpSpPr>
+      <p:sp useBgFill="1">
+        <p:nvSpPr>
+          <p:cNvPr id="23" name="Rectangle 22">
+            <a:extLst>
+              <a:ext uri="{FF2B5EF4-FFF2-40B4-BE49-F238E27FC236}">
+                <a16:creationId xmlns:a16="http://schemas.microsoft.com/office/drawing/2014/main" id="{0B9EE3F3-89B7-43C3-8651-C4C96830993D}"/>
+              </a:ext>
+              <a:ext uri="{C183D7F6-B498-43B3-948B-1728B52AA6E4}">
+                <adec:decorative xmlns:adec="http://schemas.microsoft.com/office/drawing/2017/decorative" val="1"/>
+              </a:ext>
+            </a:extLst>
+          </p:cNvPr>
+          <p:cNvSpPr>
+            <a:spLocks noGrp="1" noRot="1" noChangeAspect="1" noMove="1" noResize="1" noEditPoints="1" noAdjustHandles="1" noChangeArrowheads="1" noChangeShapeType="1" noTextEdit="1"/>
+          </p:cNvSpPr>
+          <p:nvPr>
+            <p:extLst>
+              <p:ext uri="{386F3935-93C4-4BCD-93E2-E3B085C9AB24}">
+                <p16:designElem xmlns:p16="http://schemas.microsoft.com/office/powerpoint/2015/main" val="1"/>
+              </p:ext>
+            </p:extLst>
+          </p:nvPr>
+        </p:nvSpPr>
+        <p:spPr>
+          <a:xfrm>
+            <a:off x="0" y="0"/>
+            <a:ext cx="12192000" cy="6858000"/>
+          </a:xfrm>
+          <a:prstGeom prst="rect">
+            <a:avLst/>
+          </a:prstGeom>
+          <a:ln>
+            <a:noFill/>
+          </a:ln>
+        </p:spPr>
+        <p:style>
+          <a:lnRef idx="2">
+            <a:schemeClr val="accent1">
+              <a:shade val="50000"/>
+            </a:schemeClr>
+          </a:lnRef>
+          <a:fillRef idx="1">
+            <a:schemeClr val="accent1"/>
+          </a:fillRef>
+          <a:effectRef idx="0">
+            <a:schemeClr val="accent1"/>
+          </a:effectRef>
+          <a:fontRef idx="minor">
+            <a:schemeClr val="lt1"/>
+          </a:fontRef>
+        </p:style>
+        <p:txBody>
+          <a:bodyPr rtlCol="0" anchor="ctr"/>
+          <a:lstStyle/>
+          <a:p>
+            <a:pPr algn="ctr"/>
+            <a:endParaRPr lang="en-US"/>
+          </a:p>
+        </p:txBody>
+      </p:sp>
+      <p:sp>
+        <p:nvSpPr>
+          <p:cNvPr id="2" name="Title 1">
+            <a:extLst>
+              <a:ext uri="{FF2B5EF4-FFF2-40B4-BE49-F238E27FC236}">
+                <a16:creationId xmlns:a16="http://schemas.microsoft.com/office/drawing/2014/main" id="{69B8BA33-CF05-0548-999E-720A8E0240B2}"/>
+              </a:ext>
+            </a:extLst>
+          </p:cNvPr>
+          <p:cNvSpPr>
+            <a:spLocks noGrp="1"/>
+          </p:cNvSpPr>
+          <p:nvPr>
+            <p:ph type="title"/>
+          </p:nvPr>
+        </p:nvSpPr>
+        <p:spPr>
+          <a:xfrm>
+            <a:off x="411480" y="991443"/>
+            <a:ext cx="4443154" cy="1087819"/>
+          </a:xfrm>
+        </p:spPr>
+        <p:txBody>
+          <a:bodyPr anchor="b">
+            <a:normAutofit/>
+          </a:bodyPr>
+          <a:lstStyle/>
+          <a:p>
+            <a:r>
+              <a:rPr lang="en-US" sz="2900"/>
+              <a:t>EDA: Most Percentage of Admissions Offers</a:t>
+            </a:r>
+          </a:p>
+        </p:txBody>
+      </p:sp>
+      <p:sp>
+        <p:nvSpPr>
+          <p:cNvPr id="25" name="Rectangle 24">
+            <a:extLst>
+              <a:ext uri="{FF2B5EF4-FFF2-40B4-BE49-F238E27FC236}">
+                <a16:creationId xmlns:a16="http://schemas.microsoft.com/office/drawing/2014/main" id="{33AE4636-AEEC-45D6-84D4-7AC2DA48ECF8}"/>
+              </a:ext>
+              <a:ext uri="{C183D7F6-B498-43B3-948B-1728B52AA6E4}">
+                <adec:decorative xmlns:adec="http://schemas.microsoft.com/office/drawing/2017/decorative" val="1"/>
+              </a:ext>
+            </a:extLst>
+          </p:cNvPr>
+          <p:cNvSpPr>
+            <a:spLocks noGrp="1" noRot="1" noChangeAspect="1" noMove="1" noResize="1" noEditPoints="1" noAdjustHandles="1" noChangeArrowheads="1" noChangeShapeType="1" noTextEdit="1"/>
+          </p:cNvSpPr>
+          <p:nvPr>
+            <p:extLst>
+              <p:ext uri="{386F3935-93C4-4BCD-93E2-E3B085C9AB24}">
+                <p16:designElem xmlns:p16="http://schemas.microsoft.com/office/powerpoint/2015/main" val="1"/>
+              </p:ext>
+            </p:extLst>
+          </p:nvPr>
+        </p:nvSpPr>
+        <p:spPr>
+          <a:xfrm rot="5400000">
+            <a:off x="649223" y="387939"/>
+            <a:ext cx="73152" cy="548640"/>
+          </a:xfrm>
+          <a:prstGeom prst="rect">
+            <a:avLst/>
+          </a:prstGeom>
+          <a:solidFill>
+            <a:schemeClr val="accent1"/>
+          </a:solidFill>
+          <a:ln>
+            <a:noFill/>
+          </a:ln>
+        </p:spPr>
+        <p:style>
+          <a:lnRef idx="2">
+            <a:schemeClr val="accent1">
+              <a:shade val="50000"/>
+            </a:schemeClr>
+          </a:lnRef>
+          <a:fillRef idx="1">
+            <a:schemeClr val="accent1"/>
+          </a:fillRef>
+          <a:effectRef idx="0">
+            <a:schemeClr val="accent1"/>
+          </a:effectRef>
+          <a:fontRef idx="minor">
+            <a:schemeClr val="lt1"/>
+          </a:fontRef>
+        </p:style>
+        <p:txBody>
+          <a:bodyPr rtlCol="0" anchor="ctr"/>
+          <a:lstStyle/>
+          <a:p>
+            <a:pPr marL="0" marR="0" lvl="0" indent="0" algn="ctr" defTabSz="914400" rtl="0" eaLnBrk="1" fontAlgn="auto" latinLnBrk="0" hangingPunct="1">
+              <a:lnSpc>
+                <a:spcPct val="100000"/>
+              </a:lnSpc>
+              <a:spcBef>
+                <a:spcPts val="0"/>
+              </a:spcBef>
+              <a:spcAft>
+                <a:spcPts val="0"/>
+              </a:spcAft>
+              <a:buClrTx/>
+              <a:buSzTx/>
+              <a:buFontTx/>
+              <a:buNone/>
+              <a:tabLst/>
+              <a:defRPr/>
+            </a:pPr>
+            <a:endParaRPr kumimoji="0" lang="en-US" sz="1800" b="0" i="0" u="none" strike="noStrike" kern="1200" cap="none" spc="0" normalizeH="0" baseline="0" noProof="0">
+              <a:ln>
+                <a:noFill/>
+              </a:ln>
+              <a:solidFill>
+                <a:prstClr val="white"/>
+              </a:solidFill>
+              <a:effectLst/>
+              <a:uLnTx/>
+              <a:uFillTx/>
+              <a:latin typeface="Calibri" panose="020F0502020204030204"/>
+              <a:ea typeface="+mn-ea"/>
+              <a:cs typeface="+mn-cs"/>
+            </a:endParaRPr>
+          </a:p>
+        </p:txBody>
+      </p:sp>
+      <p:sp>
+        <p:nvSpPr>
+          <p:cNvPr id="27" name="Rectangle 26">
+            <a:extLst>
+              <a:ext uri="{FF2B5EF4-FFF2-40B4-BE49-F238E27FC236}">
+                <a16:creationId xmlns:a16="http://schemas.microsoft.com/office/drawing/2014/main" id="{8D9CE0F4-2EB2-4F1F-8AAC-DB3571D9FE10}"/>
+              </a:ext>
+              <a:ext uri="{C183D7F6-B498-43B3-948B-1728B52AA6E4}">
+                <adec:decorative xmlns:adec="http://schemas.microsoft.com/office/drawing/2017/decorative" val="1"/>
+              </a:ext>
+            </a:extLst>
+          </p:cNvPr>
+          <p:cNvSpPr>
+            <a:spLocks noGrp="1" noRot="1" noChangeAspect="1" noMove="1" noResize="1" noEditPoints="1" noAdjustHandles="1" noChangeArrowheads="1" noChangeShapeType="1" noTextEdit="1"/>
+          </p:cNvSpPr>
+          <p:nvPr>
+            <p:extLst>
+              <p:ext uri="{386F3935-93C4-4BCD-93E2-E3B085C9AB24}">
+                <p16:designElem xmlns:p16="http://schemas.microsoft.com/office/powerpoint/2015/main" val="1"/>
+              </p:ext>
+            </p:extLst>
+          </p:nvPr>
+        </p:nvSpPr>
+        <p:spPr>
+          <a:xfrm>
+            <a:off x="411480" y="2285541"/>
+            <a:ext cx="4389120" cy="18288"/>
+          </a:xfrm>
+          <a:prstGeom prst="rect">
+            <a:avLst/>
+          </a:prstGeom>
+          <a:solidFill>
+            <a:schemeClr val="tx2">
+              <a:lumMod val="25000"/>
+              <a:lumOff val="75000"/>
+            </a:schemeClr>
+          </a:solidFill>
+          <a:ln w="3175">
+            <a:noFill/>
+          </a:ln>
+          <a:effectLst/>
+        </p:spPr>
+        <p:style>
+          <a:lnRef idx="2">
+            <a:schemeClr val="accent1">
+              <a:shade val="50000"/>
+            </a:schemeClr>
+          </a:lnRef>
+          <a:fillRef idx="1">
+            <a:schemeClr val="accent1"/>
+          </a:fillRef>
+          <a:effectRef idx="0">
+            <a:schemeClr val="accent1"/>
+          </a:effectRef>
+          <a:fontRef idx="minor">
+            <a:schemeClr val="lt1"/>
+          </a:fontRef>
+        </p:style>
+        <p:txBody>
+          <a:bodyPr rtlCol="0" anchor="ctr"/>
+          <a:lstStyle/>
+          <a:p>
+            <a:pPr marL="0" marR="0" lvl="0" indent="0" algn="ctr" defTabSz="914400" rtl="0" eaLnBrk="1" fontAlgn="auto" latinLnBrk="0" hangingPunct="1">
+              <a:lnSpc>
+                <a:spcPct val="100000"/>
+              </a:lnSpc>
+              <a:spcBef>
+                <a:spcPts val="0"/>
+              </a:spcBef>
+              <a:spcAft>
+                <a:spcPts val="0"/>
+              </a:spcAft>
+              <a:buClrTx/>
+              <a:buSzTx/>
+              <a:buFontTx/>
+              <a:buNone/>
+              <a:tabLst/>
+              <a:defRPr/>
+            </a:pPr>
+            <a:endParaRPr kumimoji="0" lang="en-US" sz="1800" b="0" i="0" u="none" strike="noStrike" kern="1200" cap="none" spc="0" normalizeH="0" baseline="0" noProof="0">
+              <a:ln>
+                <a:noFill/>
+              </a:ln>
+              <a:solidFill>
+                <a:prstClr val="white"/>
+              </a:solidFill>
+              <a:effectLst/>
+              <a:uLnTx/>
+              <a:uFillTx/>
+              <a:latin typeface="Calibri" panose="020F0502020204030204"/>
+              <a:ea typeface="+mn-ea"/>
+              <a:cs typeface="+mn-cs"/>
+            </a:endParaRPr>
+          </a:p>
+        </p:txBody>
+      </p:sp>
+      <p:sp>
+        <p:nvSpPr>
+          <p:cNvPr id="9" name="Content Placeholder 8">
+            <a:extLst>
+              <a:ext uri="{FF2B5EF4-FFF2-40B4-BE49-F238E27FC236}">
+                <a16:creationId xmlns:a16="http://schemas.microsoft.com/office/drawing/2014/main" id="{2D19A7FD-C0F9-4A34-B3FA-1E782BC1D38A}"/>
+              </a:ext>
+            </a:extLst>
+          </p:cNvPr>
+          <p:cNvSpPr>
+            <a:spLocks noGrp="1"/>
+          </p:cNvSpPr>
+          <p:nvPr>
+            <p:ph idx="1"/>
+          </p:nvPr>
+        </p:nvSpPr>
+        <p:spPr>
+          <a:xfrm>
+            <a:off x="411480" y="2684095"/>
+            <a:ext cx="4443154" cy="3492868"/>
+          </a:xfrm>
+        </p:spPr>
+        <p:txBody>
+          <a:bodyPr>
+            <a:normAutofit/>
+          </a:bodyPr>
+          <a:lstStyle/>
+          <a:p>
+            <a:r>
+              <a:rPr lang="en-US" sz="1700" dirty="0"/>
+              <a:t>Among the schools with the highest percentage of their test takers/students receiving admissions offers, nearly all have less than 50% Black &amp; Latinx student bodies (green).</a:t>
+            </a:r>
+          </a:p>
+        </p:txBody>
+      </p:sp>
+      <p:pic>
+        <p:nvPicPr>
+          <p:cNvPr id="5" name="Content Placeholder 4" descr="A picture containing chart&#10;&#10;Description automatically generated">
+            <a:extLst>
+              <a:ext uri="{FF2B5EF4-FFF2-40B4-BE49-F238E27FC236}">
+                <a16:creationId xmlns:a16="http://schemas.microsoft.com/office/drawing/2014/main" id="{59D188C5-604C-D347-B824-35D674034778}"/>
+              </a:ext>
+            </a:extLst>
+          </p:cNvPr>
+          <p:cNvPicPr>
+            <a:picLocks noChangeAspect="1"/>
+          </p:cNvPicPr>
+          <p:nvPr/>
+        </p:nvPicPr>
+        <p:blipFill rotWithShape="1">
+          <a:blip r:embed="rId2"/>
+          <a:srcRect l="7020" r="3" b="3"/>
+          <a:stretch/>
+        </p:blipFill>
+        <p:spPr>
+          <a:xfrm>
+            <a:off x="4855249" y="477391"/>
+            <a:ext cx="7311226" cy="6035040"/>
+          </a:xfrm>
+          <a:prstGeom prst="rect">
+            <a:avLst/>
+          </a:prstGeom>
+        </p:spPr>
+      </p:pic>
+    </p:spTree>
+    <p:extLst>
+      <p:ext uri="{BB962C8B-B14F-4D97-AF65-F5344CB8AC3E}">
+        <p14:creationId xmlns:p14="http://schemas.microsoft.com/office/powerpoint/2010/main" val="1895960851"/>
       </p:ext>
     </p:extLst>
   </p:cSld>

</xml_diff>

<commit_message>
Add new visualizations to full report and slide deck
</commit_message>
<xml_diff>
--- a/reports/submission/Capstone_Final_Presentation.pptx
+++ b/reports/submission/Capstone_Final_Presentation.pptx
@@ -2549,9 +2549,7 @@
               </a:schemeClr>
             </a:solidFill>
             <a:ln>
-              <a:solidFill>
-                <a:schemeClr val="accent1"/>
-              </a:solidFill>
+              <a:noFill/>
             </a:ln>
             <a:effectLst/>
           </c:spPr>
@@ -6778,7 +6776,7 @@
           <a:p>
             <a:fld id="{02AC24A9-CCB6-4F8D-B8DB-C2F3692CFA5A}" type="datetimeFigureOut">
               <a:rPr lang="en-US" smtClean="0"/>
-              <a:t>11/16/20</a:t>
+              <a:t>11/17/20</a:t>
             </a:fld>
             <a:endParaRPr lang="en-US" dirty="0"/>
           </a:p>
@@ -7148,7 +7146,7 @@
           <a:p>
             <a:fld id="{02AC24A9-CCB6-4F8D-B8DB-C2F3692CFA5A}" type="datetimeFigureOut">
               <a:rPr lang="en-US" smtClean="0"/>
-              <a:t>11/16/20</a:t>
+              <a:t>11/17/20</a:t>
             </a:fld>
             <a:endParaRPr lang="en-US"/>
           </a:p>
@@ -7357,7 +7355,7 @@
           <a:p>
             <a:fld id="{02AC24A9-CCB6-4F8D-B8DB-C2F3692CFA5A}" type="datetimeFigureOut">
               <a:rPr lang="en-US" smtClean="0"/>
-              <a:t>11/16/20</a:t>
+              <a:t>11/17/20</a:t>
             </a:fld>
             <a:endParaRPr lang="en-US"/>
           </a:p>
@@ -7827,7 +7825,7 @@
           <a:p>
             <a:fld id="{02AC24A9-CCB6-4F8D-B8DB-C2F3692CFA5A}" type="datetimeFigureOut">
               <a:rPr lang="en-US" smtClean="0"/>
-              <a:t>11/16/20</a:t>
+              <a:t>11/17/20</a:t>
             </a:fld>
             <a:endParaRPr lang="en-US"/>
           </a:p>
@@ -8281,7 +8279,7 @@
           <a:p>
             <a:fld id="{02AC24A9-CCB6-4F8D-B8DB-C2F3692CFA5A}" type="datetimeFigureOut">
               <a:rPr lang="en-US" smtClean="0"/>
-              <a:t>11/16/20</a:t>
+              <a:t>11/17/20</a:t>
             </a:fld>
             <a:endParaRPr lang="en-US"/>
           </a:p>
@@ -8813,7 +8811,7 @@
           <a:p>
             <a:fld id="{02AC24A9-CCB6-4F8D-B8DB-C2F3692CFA5A}" type="datetimeFigureOut">
               <a:rPr lang="en-US" smtClean="0"/>
-              <a:t>11/16/20</a:t>
+              <a:t>11/17/20</a:t>
             </a:fld>
             <a:endParaRPr lang="en-US"/>
           </a:p>
@@ -9512,7 +9510,7 @@
           <a:p>
             <a:fld id="{02AC24A9-CCB6-4F8D-B8DB-C2F3692CFA5A}" type="datetimeFigureOut">
               <a:rPr lang="en-US" smtClean="0"/>
-              <a:t>11/16/20</a:t>
+              <a:t>11/17/20</a:t>
             </a:fld>
             <a:endParaRPr lang="en-US"/>
           </a:p>
@@ -9841,7 +9839,7 @@
           <a:p>
             <a:fld id="{02AC24A9-CCB6-4F8D-B8DB-C2F3692CFA5A}" type="datetimeFigureOut">
               <a:rPr lang="en-US" smtClean="0"/>
-              <a:t>11/16/20</a:t>
+              <a:t>11/17/20</a:t>
             </a:fld>
             <a:endParaRPr lang="en-US"/>
           </a:p>
@@ -9954,7 +9952,7 @@
           <a:p>
             <a:fld id="{02AC24A9-CCB6-4F8D-B8DB-C2F3692CFA5A}" type="datetimeFigureOut">
               <a:rPr lang="en-US" smtClean="0"/>
-              <a:t>11/16/20</a:t>
+              <a:t>11/17/20</a:t>
             </a:fld>
             <a:endParaRPr lang="en-US"/>
           </a:p>
@@ -10449,7 +10447,7 @@
           <a:p>
             <a:fld id="{02AC24A9-CCB6-4F8D-B8DB-C2F3692CFA5A}" type="datetimeFigureOut">
               <a:rPr lang="en-US" smtClean="0"/>
-              <a:t>11/16/20</a:t>
+              <a:t>11/17/20</a:t>
             </a:fld>
             <a:endParaRPr lang="en-US" dirty="0"/>
           </a:p>
@@ -10926,7 +10924,7 @@
           <a:p>
             <a:fld id="{02AC24A9-CCB6-4F8D-B8DB-C2F3692CFA5A}" type="datetimeFigureOut">
               <a:rPr lang="en-US" smtClean="0"/>
-              <a:t>11/16/20</a:t>
+              <a:t>11/17/20</a:t>
             </a:fld>
             <a:endParaRPr lang="en-US"/>
           </a:p>
@@ -11169,7 +11167,7 @@
           <a:p>
             <a:fld id="{02AC24A9-CCB6-4F8D-B8DB-C2F3692CFA5A}" type="datetimeFigureOut">
               <a:rPr lang="en-US" smtClean="0"/>
-              <a:t>11/16/20</a:t>
+              <a:t>11/17/20</a:t>
             </a:fld>
             <a:endParaRPr lang="en-US"/>
           </a:p>
@@ -12300,7 +12298,7 @@
             </a:br>
             <a:r>
               <a:rPr lang="en-US" sz="3200" dirty="0"/>
-              <a:t>Highest Percent of SH Offers</a:t>
+              <a:t>Highest Percent of SHS Offers</a:t>
             </a:r>
           </a:p>
         </p:txBody>
@@ -12803,7 +12801,7 @@
             </a:br>
             <a:r>
               <a:rPr lang="en-US" sz="3200" dirty="0"/>
-              <a:t>Least Percent of SH Offers</a:t>
+              <a:t>Least Percent of SHS Offers</a:t>
             </a:r>
           </a:p>
         </p:txBody>
@@ -14051,7 +14049,7 @@
           <p:nvPr>
             <p:extLst>
               <p:ext uri="{D42A27DB-BD31-4B8C-83A1-F6EECF244321}">
-                <p14:modId xmlns:p14="http://schemas.microsoft.com/office/powerpoint/2010/main" val="3813589528"/>
+                <p14:modId xmlns:p14="http://schemas.microsoft.com/office/powerpoint/2010/main" val="3078532683"/>
               </p:ext>
             </p:extLst>
           </p:nvPr>
@@ -15605,7 +15603,7 @@
           <a:p>
             <a:r>
               <a:rPr lang="en-US" sz="1700" dirty="0"/>
-              <a:t>We saw earlier the positive correlation between SH offers and SHSAT test takers.</a:t>
+              <a:t>We saw earlier the positive correlation between SHS offers and SHSAT test takers.</a:t>
             </a:r>
           </a:p>
           <a:p>
@@ -17270,7 +17268,7 @@
           <a:p>
             <a:r>
               <a:rPr lang="en-US" sz="1700" dirty="0"/>
-              <a:t>Here we see that the higher the percentage of ELA/Math 4 scorers you send to take SHSAT, the more of them receive SH offers.</a:t>
+              <a:t>Here we see that the higher the percentage of ELA/Math 4 scorers you send to take SHSAT, the more of them receive SHS offers.</a:t>
             </a:r>
           </a:p>
           <a:p>
@@ -19740,7 +19738,7 @@
           <a:lstStyle/>
           <a:p>
             <a:r>
-              <a:rPr lang="en-US" sz="1800"/>
+              <a:rPr lang="en-US" sz="1800" dirty="0"/>
               <a:t>Which factors that predict success on the SHSAT can increase the number of SHS admissions offers received by Black &amp; Latinx students? </a:t>
             </a:r>
           </a:p>
@@ -20604,7 +20602,7 @@
               </a:lnSpc>
             </a:pPr>
             <a:r>
-              <a:rPr lang="en-US" sz="1400"/>
+              <a:rPr lang="en-US" sz="1400" dirty="0"/>
               <a:t>For models to perform best, improvements to data dimensionality were implemented, and several summary features were created. </a:t>
             </a:r>
           </a:p>
@@ -20615,15 +20613,15 @@
               </a:lnSpc>
             </a:pPr>
             <a:r>
-              <a:rPr lang="en-US" sz="1400"/>
+              <a:rPr lang="en-US" sz="1400" dirty="0"/>
               <a:t>For example, scores on standardized tests that were in several columns for grades 3 – 8, were summarized into one, per test, for 7</a:t>
             </a:r>
             <a:r>
-              <a:rPr lang="en-US" sz="1400" baseline="30000"/>
+              <a:rPr lang="en-US" sz="1400" baseline="30000" dirty="0"/>
               <a:t>th</a:t>
             </a:r>
             <a:r>
-              <a:rPr lang="en-US" sz="1400"/>
+              <a:rPr lang="en-US" sz="1400" dirty="0"/>
               <a:t> graders: </a:t>
             </a:r>
           </a:p>
@@ -20634,7 +20632,7 @@
               </a:lnSpc>
             </a:pPr>
             <a:r>
-              <a:rPr lang="en-US" sz="1400"/>
+              <a:rPr lang="en-US" sz="1400" dirty="0"/>
               <a:t>Standardized test scores, for each grade, consisted of two kinds of information, ELA (English Language Arts) &amp; Math.</a:t>
             </a:r>
           </a:p>
@@ -20645,7 +20643,7 @@
               </a:lnSpc>
             </a:pPr>
             <a:r>
-              <a:rPr lang="en-US" sz="1400"/>
+              <a:rPr lang="en-US" sz="1400" dirty="0"/>
               <a:t>Scoring on these tests top out at 4, with 1 representing the worst score.</a:t>
             </a:r>
           </a:p>
@@ -20656,15 +20654,15 @@
               </a:lnSpc>
             </a:pPr>
             <a:r>
-              <a:rPr lang="en-US" sz="1400"/>
+              <a:rPr lang="en-US" sz="1400" dirty="0"/>
               <a:t>I’m only focusing on 7</a:t>
             </a:r>
             <a:r>
-              <a:rPr lang="en-US" sz="1400" baseline="30000"/>
+              <a:rPr lang="en-US" sz="1400" baseline="30000" dirty="0"/>
               <a:t>th</a:t>
             </a:r>
             <a:r>
-              <a:rPr lang="en-US" sz="1400"/>
+              <a:rPr lang="en-US" sz="1400" dirty="0"/>
               <a:t> graders as those were the pool of students taking the SHSAT in the 2017-2018 SHSAT dataset.</a:t>
             </a:r>
           </a:p>
@@ -21654,7 +21652,7 @@
           <a:p>
             <a:r>
               <a:rPr lang="en-US" sz="1700" dirty="0"/>
-              <a:t>Seeing that ELA &amp; Math 4 scores are tied to the number of SH offers, we’ll dig a bit deeper.</a:t>
+              <a:t>Seeing that ELA &amp; Math 4 scores are tied to the number of SHS offers, we’ll dig a bit deeper.</a:t>
             </a:r>
           </a:p>
           <a:p>
@@ -22426,7 +22424,7 @@
             </a:br>
             <a:r>
               <a:rPr lang="en-US" sz="3200" dirty="0"/>
-              <a:t>Highest Number of SH Offers</a:t>
+              <a:t>Highest Number of SHS Offers</a:t>
             </a:r>
           </a:p>
         </p:txBody>
@@ -22649,7 +22647,7 @@
           <a:p>
             <a:r>
               <a:rPr lang="en-US" sz="1800" dirty="0"/>
-              <a:t>Among the schools that received the highest number of SHS offers, nearly all are composed of fewer than 30% Black or Latinx students</a:t>
+              <a:t>Among the schools that received the highest number of SHS offers, nearly all are composed of fewer than 30% Black or Latinx students.</a:t>
             </a:r>
           </a:p>
         </p:txBody>

</xml_diff>